<commit_message>
update model presentation with all differential equationss visualized
</commit_message>
<xml_diff>
--- a/model_representation.pptx
+++ b/model_representation.pptx
@@ -260,7 +260,7 @@
           <a:p>
             <a:fld id="{0C688EB7-E1EC-4125-A900-79B98438A0A3}" type="datetimeFigureOut">
               <a:rPr lang="nl-NL" smtClean="0"/>
-              <a:t>16-10-2018</a:t>
+              <a:t>17-10-2018</a:t>
             </a:fld>
             <a:endParaRPr lang="nl-NL"/>
           </a:p>
@@ -458,7 +458,7 @@
           <a:p>
             <a:fld id="{0C688EB7-E1EC-4125-A900-79B98438A0A3}" type="datetimeFigureOut">
               <a:rPr lang="nl-NL" smtClean="0"/>
-              <a:t>16-10-2018</a:t>
+              <a:t>17-10-2018</a:t>
             </a:fld>
             <a:endParaRPr lang="nl-NL"/>
           </a:p>
@@ -666,7 +666,7 @@
           <a:p>
             <a:fld id="{0C688EB7-E1EC-4125-A900-79B98438A0A3}" type="datetimeFigureOut">
               <a:rPr lang="nl-NL" smtClean="0"/>
-              <a:t>16-10-2018</a:t>
+              <a:t>17-10-2018</a:t>
             </a:fld>
             <a:endParaRPr lang="nl-NL"/>
           </a:p>
@@ -864,7 +864,7 @@
           <a:p>
             <a:fld id="{0C688EB7-E1EC-4125-A900-79B98438A0A3}" type="datetimeFigureOut">
               <a:rPr lang="nl-NL" smtClean="0"/>
-              <a:t>16-10-2018</a:t>
+              <a:t>17-10-2018</a:t>
             </a:fld>
             <a:endParaRPr lang="nl-NL"/>
           </a:p>
@@ -1139,7 +1139,7 @@
           <a:p>
             <a:fld id="{0C688EB7-E1EC-4125-A900-79B98438A0A3}" type="datetimeFigureOut">
               <a:rPr lang="nl-NL" smtClean="0"/>
-              <a:t>16-10-2018</a:t>
+              <a:t>17-10-2018</a:t>
             </a:fld>
             <a:endParaRPr lang="nl-NL"/>
           </a:p>
@@ -1404,7 +1404,7 @@
           <a:p>
             <a:fld id="{0C688EB7-E1EC-4125-A900-79B98438A0A3}" type="datetimeFigureOut">
               <a:rPr lang="nl-NL" smtClean="0"/>
-              <a:t>16-10-2018</a:t>
+              <a:t>17-10-2018</a:t>
             </a:fld>
             <a:endParaRPr lang="nl-NL"/>
           </a:p>
@@ -1816,7 +1816,7 @@
           <a:p>
             <a:fld id="{0C688EB7-E1EC-4125-A900-79B98438A0A3}" type="datetimeFigureOut">
               <a:rPr lang="nl-NL" smtClean="0"/>
-              <a:t>16-10-2018</a:t>
+              <a:t>17-10-2018</a:t>
             </a:fld>
             <a:endParaRPr lang="nl-NL"/>
           </a:p>
@@ -1957,7 +1957,7 @@
           <a:p>
             <a:fld id="{0C688EB7-E1EC-4125-A900-79B98438A0A3}" type="datetimeFigureOut">
               <a:rPr lang="nl-NL" smtClean="0"/>
-              <a:t>16-10-2018</a:t>
+              <a:t>17-10-2018</a:t>
             </a:fld>
             <a:endParaRPr lang="nl-NL"/>
           </a:p>
@@ -2070,7 +2070,7 @@
           <a:p>
             <a:fld id="{0C688EB7-E1EC-4125-A900-79B98438A0A3}" type="datetimeFigureOut">
               <a:rPr lang="nl-NL" smtClean="0"/>
-              <a:t>16-10-2018</a:t>
+              <a:t>17-10-2018</a:t>
             </a:fld>
             <a:endParaRPr lang="nl-NL"/>
           </a:p>
@@ -2381,7 +2381,7 @@
           <a:p>
             <a:fld id="{0C688EB7-E1EC-4125-A900-79B98438A0A3}" type="datetimeFigureOut">
               <a:rPr lang="nl-NL" smtClean="0"/>
-              <a:t>16-10-2018</a:t>
+              <a:t>17-10-2018</a:t>
             </a:fld>
             <a:endParaRPr lang="nl-NL"/>
           </a:p>
@@ -2669,7 +2669,7 @@
           <a:p>
             <a:fld id="{0C688EB7-E1EC-4125-A900-79B98438A0A3}" type="datetimeFigureOut">
               <a:rPr lang="nl-NL" smtClean="0"/>
-              <a:t>16-10-2018</a:t>
+              <a:t>17-10-2018</a:t>
             </a:fld>
             <a:endParaRPr lang="nl-NL"/>
           </a:p>
@@ -2910,7 +2910,7 @@
           <a:p>
             <a:fld id="{0C688EB7-E1EC-4125-A900-79B98438A0A3}" type="datetimeFigureOut">
               <a:rPr lang="nl-NL" smtClean="0"/>
-              <a:t>16-10-2018</a:t>
+              <a:t>17-10-2018</a:t>
             </a:fld>
             <a:endParaRPr lang="nl-NL"/>
           </a:p>
@@ -4357,7 +4357,7 @@
         </p:nvSpPr>
         <p:spPr>
           <a:xfrm>
-            <a:off x="3187817" y="2055303"/>
+            <a:off x="3070368" y="1677798"/>
             <a:ext cx="2332139" cy="1442906"/>
           </a:xfrm>
           <a:prstGeom prst="roundRect">
@@ -4386,7 +4386,7 @@
           <a:p>
             <a:pPr algn="ctr"/>
             <a:r>
-              <a:rPr lang="el-GR" dirty="0"/>
+              <a:rPr lang="el-GR" sz="3200" dirty="0"/>
               <a:t>θ</a:t>
             </a:r>
             <a:endParaRPr lang="nl-NL" dirty="0"/>
@@ -4407,8 +4407,8 @@
         </p:nvSpPr>
         <p:spPr>
           <a:xfrm>
-            <a:off x="2273417" y="2155971"/>
-            <a:ext cx="914400" cy="478172"/>
+            <a:off x="5402505" y="1778467"/>
+            <a:ext cx="2776755" cy="478172"/>
           </a:xfrm>
           <a:prstGeom prst="rightArrow">
             <a:avLst/>
@@ -4436,9 +4436,10 @@
           <a:p>
             <a:pPr algn="ctr"/>
             <a:r>
-              <a:rPr lang="nl-NL" dirty="0"/>
-              <a:t>E</a:t>
-            </a:r>
+              <a:rPr lang="nl-NL" dirty="0" err="1"/>
+              <a:t>Melting</a:t>
+            </a:r>
+            <a:endParaRPr lang="nl-NL" dirty="0"/>
           </a:p>
         </p:txBody>
       </p:sp>
@@ -4456,8 +4457,8 @@
         </p:nvSpPr>
         <p:spPr>
           <a:xfrm>
-            <a:off x="2273417" y="2776756"/>
-            <a:ext cx="914400" cy="478172"/>
+            <a:off x="293613" y="2399251"/>
+            <a:ext cx="2776755" cy="478172"/>
           </a:xfrm>
           <a:prstGeom prst="rightArrow">
             <a:avLst/>
@@ -4485,9 +4486,510 @@
           <a:p>
             <a:pPr algn="ctr"/>
             <a:r>
+              <a:rPr lang="nl-NL" dirty="0" err="1"/>
+              <a:t>Condensation</a:t>
+            </a:r>
+            <a:endParaRPr lang="nl-NL" dirty="0"/>
+          </a:p>
+        </p:txBody>
+      </p:sp>
+      <p:sp>
+        <p:nvSpPr>
+          <p:cNvPr id="2" name="Pijl: links 1">
+            <a:extLst>
+              <a:ext uri="{FF2B5EF4-FFF2-40B4-BE49-F238E27FC236}">
+                <a16:creationId xmlns:a16="http://schemas.microsoft.com/office/drawing/2014/main" id="{6AAB492B-F60D-4EF7-999C-D27234BF2911}"/>
+              </a:ext>
+            </a:extLst>
+          </p:cNvPr>
+          <p:cNvSpPr/>
+          <p:nvPr/>
+        </p:nvSpPr>
+        <p:spPr>
+          <a:xfrm>
+            <a:off x="293613" y="1799439"/>
+            <a:ext cx="2776755" cy="478172"/>
+          </a:xfrm>
+          <a:prstGeom prst="leftArrow">
+            <a:avLst/>
+          </a:prstGeom>
+        </p:spPr>
+        <p:style>
+          <a:lnRef idx="2">
+            <a:schemeClr val="accent2">
+              <a:shade val="50000"/>
+            </a:schemeClr>
+          </a:lnRef>
+          <a:fillRef idx="1">
+            <a:schemeClr val="accent2"/>
+          </a:fillRef>
+          <a:effectRef idx="0">
+            <a:schemeClr val="accent2"/>
+          </a:effectRef>
+          <a:fontRef idx="minor">
+            <a:schemeClr val="lt1"/>
+          </a:fontRef>
+        </p:style>
+        <p:txBody>
+          <a:bodyPr rtlCol="0" anchor="ctr"/>
+          <a:lstStyle/>
+          <a:p>
+            <a:pPr algn="ctr"/>
+            <a:r>
+              <a:rPr lang="nl-NL" dirty="0" err="1"/>
+              <a:t>Evaporation</a:t>
+            </a:r>
+            <a:endParaRPr lang="nl-NL" dirty="0"/>
+          </a:p>
+        </p:txBody>
+      </p:sp>
+      <p:sp>
+        <p:nvSpPr>
+          <p:cNvPr id="6" name="Pijl: links 5">
+            <a:extLst>
+              <a:ext uri="{FF2B5EF4-FFF2-40B4-BE49-F238E27FC236}">
+                <a16:creationId xmlns:a16="http://schemas.microsoft.com/office/drawing/2014/main" id="{0C023C0F-4A02-4DB9-9FF1-EA9135286D01}"/>
+              </a:ext>
+            </a:extLst>
+          </p:cNvPr>
+          <p:cNvSpPr/>
+          <p:nvPr/>
+        </p:nvSpPr>
+        <p:spPr>
+          <a:xfrm>
+            <a:off x="5441655" y="2399251"/>
+            <a:ext cx="2737607" cy="478172"/>
+          </a:xfrm>
+          <a:prstGeom prst="leftArrow">
+            <a:avLst/>
+          </a:prstGeom>
+        </p:spPr>
+        <p:style>
+          <a:lnRef idx="2">
+            <a:schemeClr val="accent6">
+              <a:shade val="50000"/>
+            </a:schemeClr>
+          </a:lnRef>
+          <a:fillRef idx="1">
+            <a:schemeClr val="accent6"/>
+          </a:fillRef>
+          <a:effectRef idx="0">
+            <a:schemeClr val="accent6"/>
+          </a:effectRef>
+          <a:fontRef idx="minor">
+            <a:schemeClr val="lt1"/>
+          </a:fontRef>
+        </p:style>
+        <p:txBody>
+          <a:bodyPr rtlCol="0" anchor="ctr"/>
+          <a:lstStyle/>
+          <a:p>
+            <a:pPr algn="ctr"/>
+            <a:r>
+              <a:rPr lang="nl-NL" dirty="0" err="1"/>
+              <a:t>Freezing</a:t>
+            </a:r>
+            <a:r>
               <a:rPr lang="nl-NL" dirty="0"/>
-              <a:t>C</a:t>
-            </a:r>
+              <a:t> (&amp;ice </a:t>
+            </a:r>
+            <a:r>
+              <a:rPr lang="nl-NL" dirty="0" err="1"/>
+              <a:t>deposition</a:t>
+            </a:r>
+            <a:r>
+              <a:rPr lang="nl-NL" dirty="0"/>
+              <a:t>)</a:t>
+            </a:r>
+          </a:p>
+        </p:txBody>
+      </p:sp>
+      <p:sp>
+        <p:nvSpPr>
+          <p:cNvPr id="3" name="Pijl: omhoog/omlaag 2">
+            <a:extLst>
+              <a:ext uri="{FF2B5EF4-FFF2-40B4-BE49-F238E27FC236}">
+                <a16:creationId xmlns:a16="http://schemas.microsoft.com/office/drawing/2014/main" id="{71E6161D-DC1E-49E0-878E-6A3A35F786FA}"/>
+              </a:ext>
+            </a:extLst>
+          </p:cNvPr>
+          <p:cNvSpPr/>
+          <p:nvPr/>
+        </p:nvSpPr>
+        <p:spPr>
+          <a:xfrm>
+            <a:off x="3921850" y="0"/>
+            <a:ext cx="629174" cy="1677798"/>
+          </a:xfrm>
+          <a:prstGeom prst="upDownArrow">
+            <a:avLst/>
+          </a:prstGeom>
+        </p:spPr>
+        <p:style>
+          <a:lnRef idx="2">
+            <a:schemeClr val="accent1">
+              <a:shade val="50000"/>
+            </a:schemeClr>
+          </a:lnRef>
+          <a:fillRef idx="1">
+            <a:schemeClr val="accent1"/>
+          </a:fillRef>
+          <a:effectRef idx="0">
+            <a:schemeClr val="accent1"/>
+          </a:effectRef>
+          <a:fontRef idx="minor">
+            <a:schemeClr val="lt1"/>
+          </a:fontRef>
+        </p:style>
+        <p:txBody>
+          <a:bodyPr rtlCol="0" anchor="ctr"/>
+          <a:lstStyle/>
+          <a:p>
+            <a:pPr algn="ctr"/>
+            <a:r>
+              <a:rPr lang="nl-NL" dirty="0" err="1"/>
+              <a:t>Mixing</a:t>
+            </a:r>
+            <a:endParaRPr lang="nl-NL" dirty="0"/>
+          </a:p>
+        </p:txBody>
+      </p:sp>
+      <p:sp>
+        <p:nvSpPr>
+          <p:cNvPr id="8" name="Rechthoek: afgeronde hoeken 7">
+            <a:extLst>
+              <a:ext uri="{FF2B5EF4-FFF2-40B4-BE49-F238E27FC236}">
+                <a16:creationId xmlns:a16="http://schemas.microsoft.com/office/drawing/2014/main" id="{1AE5E851-36DB-4713-922A-CEAE58B1768A}"/>
+              </a:ext>
+            </a:extLst>
+          </p:cNvPr>
+          <p:cNvSpPr/>
+          <p:nvPr/>
+        </p:nvSpPr>
+        <p:spPr>
+          <a:xfrm>
+            <a:off x="3070366" y="3670183"/>
+            <a:ext cx="2332139" cy="1308683"/>
+          </a:xfrm>
+          <a:prstGeom prst="roundRect">
+            <a:avLst/>
+          </a:prstGeom>
+        </p:spPr>
+        <p:style>
+          <a:lnRef idx="2">
+            <a:schemeClr val="accent1">
+              <a:shade val="50000"/>
+            </a:schemeClr>
+          </a:lnRef>
+          <a:fillRef idx="1">
+            <a:schemeClr val="accent1"/>
+          </a:fillRef>
+          <a:effectRef idx="0">
+            <a:schemeClr val="accent1"/>
+          </a:effectRef>
+          <a:fontRef idx="minor">
+            <a:schemeClr val="lt1"/>
+          </a:fontRef>
+        </p:style>
+        <p:txBody>
+          <a:bodyPr rtlCol="0" anchor="ctr"/>
+          <a:lstStyle/>
+          <a:p>
+            <a:pPr algn="ctr"/>
+            <a:r>
+              <a:rPr lang="nl-NL" dirty="0"/>
+              <a:t>W</a:t>
+            </a:r>
+          </a:p>
+        </p:txBody>
+      </p:sp>
+      <p:sp>
+        <p:nvSpPr>
+          <p:cNvPr id="9" name="Pijl: omlaag 8">
+            <a:extLst>
+              <a:ext uri="{FF2B5EF4-FFF2-40B4-BE49-F238E27FC236}">
+                <a16:creationId xmlns:a16="http://schemas.microsoft.com/office/drawing/2014/main" id="{99661318-C7B6-4725-B4FA-157249CC6549}"/>
+              </a:ext>
+            </a:extLst>
+          </p:cNvPr>
+          <p:cNvSpPr/>
+          <p:nvPr/>
+        </p:nvSpPr>
+        <p:spPr>
+          <a:xfrm>
+            <a:off x="3921848" y="4978866"/>
+            <a:ext cx="629174" cy="1690382"/>
+          </a:xfrm>
+          <a:prstGeom prst="downArrow">
+            <a:avLst/>
+          </a:prstGeom>
+        </p:spPr>
+        <p:style>
+          <a:lnRef idx="2">
+            <a:schemeClr val="accent2">
+              <a:shade val="50000"/>
+            </a:schemeClr>
+          </a:lnRef>
+          <a:fillRef idx="1">
+            <a:schemeClr val="accent2"/>
+          </a:fillRef>
+          <a:effectRef idx="0">
+            <a:schemeClr val="accent2"/>
+          </a:effectRef>
+          <a:fontRef idx="minor">
+            <a:schemeClr val="lt1"/>
+          </a:fontRef>
+        </p:style>
+        <p:txBody>
+          <a:bodyPr rtlCol="0" anchor="ctr"/>
+          <a:lstStyle/>
+          <a:p>
+            <a:pPr algn="ctr"/>
+            <a:r>
+              <a:rPr lang="nl-NL"/>
+              <a:t>Mixing</a:t>
+            </a:r>
+            <a:endParaRPr lang="nl-NL" dirty="0"/>
+          </a:p>
+        </p:txBody>
+      </p:sp>
+      <p:sp>
+        <p:nvSpPr>
+          <p:cNvPr id="12" name="Pijl: links/rechts 11">
+            <a:extLst>
+              <a:ext uri="{FF2B5EF4-FFF2-40B4-BE49-F238E27FC236}">
+                <a16:creationId xmlns:a16="http://schemas.microsoft.com/office/drawing/2014/main" id="{4D60C98B-9917-42A0-83FD-A5F59DB5BD18}"/>
+              </a:ext>
+            </a:extLst>
+          </p:cNvPr>
+          <p:cNvSpPr/>
+          <p:nvPr/>
+        </p:nvSpPr>
+        <p:spPr>
+          <a:xfrm>
+            <a:off x="5382931" y="4085438"/>
+            <a:ext cx="2776754" cy="478172"/>
+          </a:xfrm>
+          <a:prstGeom prst="leftRightArrow">
+            <a:avLst/>
+          </a:prstGeom>
+        </p:spPr>
+        <p:style>
+          <a:lnRef idx="2">
+            <a:schemeClr val="accent1">
+              <a:shade val="50000"/>
+            </a:schemeClr>
+          </a:lnRef>
+          <a:fillRef idx="1">
+            <a:schemeClr val="accent1"/>
+          </a:fillRef>
+          <a:effectRef idx="0">
+            <a:schemeClr val="accent1"/>
+          </a:effectRef>
+          <a:fontRef idx="minor">
+            <a:schemeClr val="lt1"/>
+          </a:fontRef>
+        </p:style>
+        <p:txBody>
+          <a:bodyPr rtlCol="0" anchor="ctr"/>
+          <a:lstStyle/>
+          <a:p>
+            <a:pPr algn="ctr"/>
+            <a:endParaRPr lang="nl-NL"/>
+          </a:p>
+        </p:txBody>
+      </p:sp>
+      <p:sp>
+        <p:nvSpPr>
+          <p:cNvPr id="13" name="Tekstvak 12">
+            <a:extLst>
+              <a:ext uri="{FF2B5EF4-FFF2-40B4-BE49-F238E27FC236}">
+                <a16:creationId xmlns:a16="http://schemas.microsoft.com/office/drawing/2014/main" id="{AC47547E-73C5-4726-9813-2BCB54BBA1D4}"/>
+              </a:ext>
+            </a:extLst>
+          </p:cNvPr>
+          <p:cNvSpPr txBox="1"/>
+          <p:nvPr/>
+        </p:nvSpPr>
+        <p:spPr>
+          <a:xfrm>
+            <a:off x="5620624" y="4139858"/>
+            <a:ext cx="2214693" cy="369332"/>
+          </a:xfrm>
+          <a:prstGeom prst="rect">
+            <a:avLst/>
+          </a:prstGeom>
+          <a:noFill/>
+        </p:spPr>
+        <p:txBody>
+          <a:bodyPr wrap="square" rtlCol="0">
+            <a:spAutoFit/>
+          </a:bodyPr>
+          <a:lstStyle/>
+          <a:p>
+            <a:pPr algn="ctr"/>
+            <a:r>
+              <a:rPr lang="nl-NL" dirty="0" err="1">
+                <a:solidFill>
+                  <a:schemeClr val="bg1"/>
+                </a:solidFill>
+              </a:rPr>
+              <a:t>Buyoancy</a:t>
+            </a:r>
+            <a:endParaRPr lang="nl-NL" dirty="0">
+              <a:solidFill>
+                <a:schemeClr val="bg1"/>
+              </a:solidFill>
+            </a:endParaRPr>
+          </a:p>
+        </p:txBody>
+      </p:sp>
+      <p:sp>
+        <p:nvSpPr>
+          <p:cNvPr id="14" name="Pijl: links 13">
+            <a:extLst>
+              <a:ext uri="{FF2B5EF4-FFF2-40B4-BE49-F238E27FC236}">
+                <a16:creationId xmlns:a16="http://schemas.microsoft.com/office/drawing/2014/main" id="{18A21050-17C0-4920-AD75-4B0E254BB8F3}"/>
+              </a:ext>
+            </a:extLst>
+          </p:cNvPr>
+          <p:cNvSpPr/>
+          <p:nvPr/>
+        </p:nvSpPr>
+        <p:spPr>
+          <a:xfrm>
+            <a:off x="293611" y="4085438"/>
+            <a:ext cx="2776755" cy="478172"/>
+          </a:xfrm>
+          <a:prstGeom prst="leftArrow">
+            <a:avLst/>
+          </a:prstGeom>
+        </p:spPr>
+        <p:style>
+          <a:lnRef idx="2">
+            <a:schemeClr val="accent2">
+              <a:shade val="50000"/>
+            </a:schemeClr>
+          </a:lnRef>
+          <a:fillRef idx="1">
+            <a:schemeClr val="accent2"/>
+          </a:fillRef>
+          <a:effectRef idx="0">
+            <a:schemeClr val="accent2"/>
+          </a:effectRef>
+          <a:fontRef idx="minor">
+            <a:schemeClr val="lt1"/>
+          </a:fontRef>
+        </p:style>
+        <p:txBody>
+          <a:bodyPr rtlCol="0" anchor="ctr"/>
+          <a:lstStyle/>
+          <a:p>
+            <a:pPr algn="ctr"/>
+            <a:r>
+              <a:rPr lang="nl-NL" dirty="0"/>
+              <a:t>Cloud content</a:t>
+            </a:r>
+          </a:p>
+        </p:txBody>
+      </p:sp>
+      <p:sp>
+        <p:nvSpPr>
+          <p:cNvPr id="15" name="Rechthoek: afgeronde hoeken 14">
+            <a:extLst>
+              <a:ext uri="{FF2B5EF4-FFF2-40B4-BE49-F238E27FC236}">
+                <a16:creationId xmlns:a16="http://schemas.microsoft.com/office/drawing/2014/main" id="{AE2F06AC-316D-49E6-A27A-73317C6C6B1C}"/>
+              </a:ext>
+            </a:extLst>
+          </p:cNvPr>
+          <p:cNvSpPr/>
+          <p:nvPr/>
+        </p:nvSpPr>
+        <p:spPr>
+          <a:xfrm>
+            <a:off x="9212508" y="1677798"/>
+            <a:ext cx="2332139" cy="1442906"/>
+          </a:xfrm>
+          <a:prstGeom prst="roundRect">
+            <a:avLst/>
+          </a:prstGeom>
+        </p:spPr>
+        <p:style>
+          <a:lnRef idx="2">
+            <a:schemeClr val="accent1">
+              <a:shade val="50000"/>
+            </a:schemeClr>
+          </a:lnRef>
+          <a:fillRef idx="1">
+            <a:schemeClr val="accent1"/>
+          </a:fillRef>
+          <a:effectRef idx="0">
+            <a:schemeClr val="accent1"/>
+          </a:effectRef>
+          <a:fontRef idx="minor">
+            <a:schemeClr val="lt1"/>
+          </a:fontRef>
+        </p:style>
+        <p:txBody>
+          <a:bodyPr rtlCol="0" anchor="ctr"/>
+          <a:lstStyle/>
+          <a:p>
+            <a:pPr algn="ctr"/>
+            <a:r>
+              <a:rPr lang="nl-NL" sz="3200" dirty="0"/>
+              <a:t>Mass</a:t>
+            </a:r>
+            <a:endParaRPr lang="nl-NL" dirty="0"/>
+          </a:p>
+        </p:txBody>
+      </p:sp>
+      <p:sp>
+        <p:nvSpPr>
+          <p:cNvPr id="16" name="Pijl: omlaag 15">
+            <a:extLst>
+              <a:ext uri="{FF2B5EF4-FFF2-40B4-BE49-F238E27FC236}">
+                <a16:creationId xmlns:a16="http://schemas.microsoft.com/office/drawing/2014/main" id="{938F40A8-15E6-44FB-B5DE-8C31B1D743A5}"/>
+              </a:ext>
+            </a:extLst>
+          </p:cNvPr>
+          <p:cNvSpPr/>
+          <p:nvPr/>
+        </p:nvSpPr>
+        <p:spPr>
+          <a:xfrm>
+            <a:off x="10063990" y="16776"/>
+            <a:ext cx="629174" cy="1677799"/>
+          </a:xfrm>
+          <a:prstGeom prst="downArrow">
+            <a:avLst/>
+          </a:prstGeom>
+        </p:spPr>
+        <p:style>
+          <a:lnRef idx="2">
+            <a:schemeClr val="accent6">
+              <a:shade val="50000"/>
+            </a:schemeClr>
+          </a:lnRef>
+          <a:fillRef idx="1">
+            <a:schemeClr val="accent6"/>
+          </a:fillRef>
+          <a:effectRef idx="0">
+            <a:schemeClr val="accent6"/>
+          </a:effectRef>
+          <a:fontRef idx="minor">
+            <a:schemeClr val="lt1"/>
+          </a:fontRef>
+        </p:style>
+        <p:txBody>
+          <a:bodyPr rtlCol="0" anchor="ctr"/>
+          <a:lstStyle/>
+          <a:p>
+            <a:pPr algn="ctr"/>
+            <a:r>
+              <a:rPr lang="nl-NL"/>
+              <a:t>Mixing</a:t>
+            </a:r>
+            <a:endParaRPr lang="nl-NL" dirty="0"/>
           </a:p>
         </p:txBody>
       </p:sp>

</xml_diff>

<commit_message>
graphs in slides changed
</commit_message>
<xml_diff>
--- a/model_representation.pptx
+++ b/model_representation.pptx
@@ -4068,8 +4068,8 @@
           </a:p>
         </p:txBody>
       </p:sp>
-      <mc:AlternateContent xmlns:mc="http://schemas.openxmlformats.org/markup-compatibility/2006">
-        <mc:Choice xmlns:a14="http://schemas.microsoft.com/office/drawing/2010/main" Requires="a14">
+      <mc:AlternateContent xmlns:mc="http://schemas.openxmlformats.org/markup-compatibility/2006" xmlns:a14="http://schemas.microsoft.com/office/drawing/2010/main">
+        <mc:Choice Requires="a14">
           <p:sp>
             <p:nvSpPr>
               <p:cNvPr id="3" name="Tijdelijke aanduiding voor inhoud 2">
@@ -4494,7 +4494,7 @@
             </p:txBody>
           </p:sp>
         </mc:Choice>
-        <mc:Fallback>
+        <mc:Fallback xmlns="">
           <p:sp>
             <p:nvSpPr>
               <p:cNvPr id="3" name="Tijdelijke aanduiding voor inhoud 2">
@@ -5025,38 +5025,18 @@
           </a:p>
           <a:p>
             <a:r>
-              <a:rPr lang="nl-NL" dirty="0" err="1"/>
-              <a:t>Mean</a:t>
-            </a:r>
-            <a:r>
-              <a:rPr lang="nl-NL" dirty="0"/>
-              <a:t> </a:t>
-            </a:r>
-            <a:r>
-              <a:rPr lang="nl-NL" dirty="0" err="1"/>
-              <a:t>areal</a:t>
-            </a:r>
-            <a:r>
-              <a:rPr lang="nl-NL" dirty="0"/>
-              <a:t> </a:t>
-            </a:r>
-            <a:r>
-              <a:rPr lang="nl-NL" dirty="0" err="1"/>
-              <a:t>precipitation</a:t>
-            </a:r>
-            <a:r>
-              <a:rPr lang="nl-NL" dirty="0"/>
-              <a:t> of 4.6 mm</a:t>
+              <a:rPr lang="nl-NL" dirty="0"/>
+              <a:t>Mean areal precipitation of 4.40 mm</a:t>
             </a:r>
           </a:p>
         </p:txBody>
       </p:sp>
       <p:pic>
         <p:nvPicPr>
-          <p:cNvPr id="4" name="Afbeelding 3">
-            <a:extLst>
-              <a:ext uri="{FF2B5EF4-FFF2-40B4-BE49-F238E27FC236}">
-                <a16:creationId xmlns:a16="http://schemas.microsoft.com/office/drawing/2014/main" id="{EAF75F50-8052-4A06-B831-EAE9BC2E0E73}"/>
+          <p:cNvPr id="9" name="Afbeelding 76">
+            <a:extLst>
+              <a:ext uri="{FF2B5EF4-FFF2-40B4-BE49-F238E27FC236}">
+                <a16:creationId xmlns:a16="http://schemas.microsoft.com/office/drawing/2014/main" id="{0800ED32-DCB1-486E-B18C-DB06263A3141}"/>
               </a:ext>
             </a:extLst>
           </p:cNvPr>
@@ -5072,7 +5052,7 @@
         <p:spPr>
           <a:xfrm>
             <a:off x="336000" y="1690688"/>
-            <a:ext cx="5760000" cy="3852000"/>
+            <a:ext cx="5760000" cy="3852278"/>
           </a:xfrm>
           <a:prstGeom prst="rect">
             <a:avLst/>
@@ -5081,10 +5061,10 @@
       </p:pic>
       <p:pic>
         <p:nvPicPr>
-          <p:cNvPr id="5" name="Afbeelding 4">
-            <a:extLst>
-              <a:ext uri="{FF2B5EF4-FFF2-40B4-BE49-F238E27FC236}">
-                <a16:creationId xmlns:a16="http://schemas.microsoft.com/office/drawing/2014/main" id="{9656B44B-CD01-484A-B085-1BA94A3D220C}"/>
+          <p:cNvPr id="10" name="Afbeelding 78">
+            <a:extLst>
+              <a:ext uri="{FF2B5EF4-FFF2-40B4-BE49-F238E27FC236}">
+                <a16:creationId xmlns:a16="http://schemas.microsoft.com/office/drawing/2014/main" id="{29BCFAB7-6899-4B82-9521-32F322AEA47E}"/>
               </a:ext>
             </a:extLst>
           </p:cNvPr>
@@ -5099,8 +5079,8 @@
         </p:blipFill>
         <p:spPr>
           <a:xfrm>
-            <a:off x="6319997" y="1553888"/>
-            <a:ext cx="5760000" cy="3988800"/>
+            <a:off x="6326673" y="1690688"/>
+            <a:ext cx="5593992" cy="3874472"/>
           </a:xfrm>
           <a:prstGeom prst="rect">
             <a:avLst/>
@@ -5109,10 +5089,10 @@
       </p:pic>
       <p:pic>
         <p:nvPicPr>
-          <p:cNvPr id="7" name="Afbeelding 6">
-            <a:extLst>
-              <a:ext uri="{FF2B5EF4-FFF2-40B4-BE49-F238E27FC236}">
-                <a16:creationId xmlns:a16="http://schemas.microsoft.com/office/drawing/2014/main" id="{15B7FC0C-1D58-4D22-8E79-9C15B5F7D890}"/>
+          <p:cNvPr id="11" name="Afbeelding 1">
+            <a:extLst>
+              <a:ext uri="{FF2B5EF4-FFF2-40B4-BE49-F238E27FC236}">
+                <a16:creationId xmlns:a16="http://schemas.microsoft.com/office/drawing/2014/main" id="{DF85EB97-5F82-4ABC-BB6E-8A7297030761}"/>
               </a:ext>
             </a:extLst>
           </p:cNvPr>
@@ -5127,8 +5107,8 @@
         </p:blipFill>
         <p:spPr>
           <a:xfrm>
-            <a:off x="-160606" y="3429000"/>
-            <a:ext cx="2880000" cy="1926000"/>
+            <a:off x="105327" y="4566920"/>
+            <a:ext cx="2879725" cy="1925955"/>
           </a:xfrm>
           <a:prstGeom prst="rect">
             <a:avLst/>
@@ -5137,16 +5117,14 @@
       </p:pic>
       <p:pic>
         <p:nvPicPr>
-          <p:cNvPr id="8" name="Tijdelijke aanduiding voor inhoud 5">
-            <a:extLst>
-              <a:ext uri="{FF2B5EF4-FFF2-40B4-BE49-F238E27FC236}">
-                <a16:creationId xmlns:a16="http://schemas.microsoft.com/office/drawing/2014/main" id="{76DF2B51-21B8-4617-8842-6B24391A03A8}"/>
-              </a:ext>
-            </a:extLst>
-          </p:cNvPr>
-          <p:cNvPicPr>
-            <a:picLocks/>
-          </p:cNvPicPr>
+          <p:cNvPr id="12" name="Afbeelding 74">
+            <a:extLst>
+              <a:ext uri="{FF2B5EF4-FFF2-40B4-BE49-F238E27FC236}">
+                <a16:creationId xmlns:a16="http://schemas.microsoft.com/office/drawing/2014/main" id="{4FFBAA79-BBAF-4E9D-AB80-8C83C40F36ED}"/>
+              </a:ext>
+            </a:extLst>
+          </p:cNvPr>
+          <p:cNvPicPr/>
           <p:nvPr/>
         </p:nvPicPr>
         <p:blipFill>
@@ -5157,8 +5135,8 @@
         </p:blipFill>
         <p:spPr>
           <a:xfrm>
-            <a:off x="6487594" y="3429000"/>
-            <a:ext cx="2880000" cy="1980000"/>
+            <a:off x="8976275" y="4532629"/>
+            <a:ext cx="2879725" cy="1994535"/>
           </a:xfrm>
           <a:prstGeom prst="rect">
             <a:avLst/>
@@ -5230,15 +5208,7 @@
             </a:r>
             <a:r>
               <a:rPr lang="nl-NL" dirty="0"/>
-              <a:t> </a:t>
-            </a:r>
-            <a:r>
-              <a:rPr lang="nl-NL" dirty="0" err="1"/>
-              <a:t>to</a:t>
-            </a:r>
-            <a:r>
-              <a:rPr lang="nl-NL" dirty="0"/>
-              <a:t> 1e-5</a:t>
+              <a:t> to 2e-5</a:t>
             </a:r>
           </a:p>
         </p:txBody>
@@ -5296,28 +5266,8 @@
           </a:p>
           <a:p>
             <a:r>
-              <a:rPr lang="nl-NL" dirty="0" err="1"/>
-              <a:t>Mean</a:t>
-            </a:r>
-            <a:r>
-              <a:rPr lang="nl-NL" dirty="0"/>
-              <a:t> </a:t>
-            </a:r>
-            <a:r>
-              <a:rPr lang="nl-NL" dirty="0" err="1"/>
-              <a:t>areal</a:t>
-            </a:r>
-            <a:r>
-              <a:rPr lang="nl-NL" dirty="0"/>
-              <a:t> </a:t>
-            </a:r>
-            <a:r>
-              <a:rPr lang="nl-NL" dirty="0" err="1"/>
-              <a:t>precipitation</a:t>
-            </a:r>
-            <a:r>
-              <a:rPr lang="nl-NL" dirty="0"/>
-              <a:t> of 7.2 mm</a:t>
+              <a:rPr lang="nl-NL" dirty="0"/>
+              <a:t>Mean areal precipitation of 4.29 mm</a:t>
             </a:r>
           </a:p>
           <a:p>
@@ -5343,10 +5293,10 @@
       </p:sp>
       <p:pic>
         <p:nvPicPr>
-          <p:cNvPr id="4" name="Afbeelding 3">
-            <a:extLst>
-              <a:ext uri="{FF2B5EF4-FFF2-40B4-BE49-F238E27FC236}">
-                <a16:creationId xmlns:a16="http://schemas.microsoft.com/office/drawing/2014/main" id="{CE255F90-22ED-4731-B51A-39AB676CF850}"/>
+          <p:cNvPr id="10" name="Afbeelding 109">
+            <a:extLst>
+              <a:ext uri="{FF2B5EF4-FFF2-40B4-BE49-F238E27FC236}">
+                <a16:creationId xmlns:a16="http://schemas.microsoft.com/office/drawing/2014/main" id="{CF5516CD-B4C7-4258-A456-D74DB67F4251}"/>
               </a:ext>
             </a:extLst>
           </p:cNvPr>
@@ -5361,8 +5311,8 @@
         </p:blipFill>
         <p:spPr>
           <a:xfrm>
-            <a:off x="270686" y="1503000"/>
-            <a:ext cx="5760000" cy="3852000"/>
+            <a:off x="407936" y="1690688"/>
+            <a:ext cx="5511296" cy="3685945"/>
           </a:xfrm>
           <a:prstGeom prst="rect">
             <a:avLst/>
@@ -5371,10 +5321,10 @@
       </p:pic>
       <p:pic>
         <p:nvPicPr>
-          <p:cNvPr id="5" name="Afbeelding 4">
-            <a:extLst>
-              <a:ext uri="{FF2B5EF4-FFF2-40B4-BE49-F238E27FC236}">
-                <a16:creationId xmlns:a16="http://schemas.microsoft.com/office/drawing/2014/main" id="{15C02C3D-37EB-4870-8951-6C6DEABFE7B4}"/>
+          <p:cNvPr id="8" name="Afbeelding 1">
+            <a:extLst>
+              <a:ext uri="{FF2B5EF4-FFF2-40B4-BE49-F238E27FC236}">
+                <a16:creationId xmlns:a16="http://schemas.microsoft.com/office/drawing/2014/main" id="{104F789D-6E53-4832-B9B2-8ABEAE9FAE44}"/>
               </a:ext>
             </a:extLst>
           </p:cNvPr>
@@ -5389,8 +5339,8 @@
         </p:blipFill>
         <p:spPr>
           <a:xfrm>
-            <a:off x="6161316" y="1169396"/>
-            <a:ext cx="5760000" cy="3988800"/>
+            <a:off x="105327" y="3823970"/>
+            <a:ext cx="2879725" cy="1925955"/>
           </a:xfrm>
           <a:prstGeom prst="rect">
             <a:avLst/>
@@ -5399,10 +5349,10 @@
       </p:pic>
       <p:pic>
         <p:nvPicPr>
-          <p:cNvPr id="6" name="Afbeelding 5">
-            <a:extLst>
-              <a:ext uri="{FF2B5EF4-FFF2-40B4-BE49-F238E27FC236}">
-                <a16:creationId xmlns:a16="http://schemas.microsoft.com/office/drawing/2014/main" id="{3020E1D4-FA2F-47FC-9FD7-0841AC71101D}"/>
+          <p:cNvPr id="11" name="Afbeelding 111">
+            <a:extLst>
+              <a:ext uri="{FF2B5EF4-FFF2-40B4-BE49-F238E27FC236}">
+                <a16:creationId xmlns:a16="http://schemas.microsoft.com/office/drawing/2014/main" id="{E0BA8CF6-AB2A-46EA-9DBB-47D065DA96FE}"/>
               </a:ext>
             </a:extLst>
           </p:cNvPr>
@@ -5417,8 +5367,8 @@
         </p:blipFill>
         <p:spPr>
           <a:xfrm>
-            <a:off x="503952" y="3278320"/>
-            <a:ext cx="2880000" cy="1926000"/>
+            <a:off x="6221841" y="1742770"/>
+            <a:ext cx="5126039" cy="3550361"/>
           </a:xfrm>
           <a:prstGeom prst="rect">
             <a:avLst/>
@@ -5427,16 +5377,14 @@
       </p:pic>
       <p:pic>
         <p:nvPicPr>
-          <p:cNvPr id="7" name="Tijdelijke aanduiding voor inhoud 5">
-            <a:extLst>
-              <a:ext uri="{FF2B5EF4-FFF2-40B4-BE49-F238E27FC236}">
-                <a16:creationId xmlns:a16="http://schemas.microsoft.com/office/drawing/2014/main" id="{D37410DD-007F-41F2-96AE-001F6420FF09}"/>
-              </a:ext>
-            </a:extLst>
-          </p:cNvPr>
-          <p:cNvPicPr>
-            <a:picLocks/>
-          </p:cNvPicPr>
+          <p:cNvPr id="9" name="Afbeelding 74">
+            <a:extLst>
+              <a:ext uri="{FF2B5EF4-FFF2-40B4-BE49-F238E27FC236}">
+                <a16:creationId xmlns:a16="http://schemas.microsoft.com/office/drawing/2014/main" id="{15602D78-24EE-4698-82B1-ED6A9C712EBC}"/>
+              </a:ext>
+            </a:extLst>
+          </p:cNvPr>
+          <p:cNvPicPr/>
           <p:nvPr/>
         </p:nvPicPr>
         <p:blipFill>
@@ -5447,8 +5395,8 @@
         </p:blipFill>
         <p:spPr>
           <a:xfrm>
-            <a:off x="9312000" y="4214320"/>
-            <a:ext cx="2880000" cy="1980000"/>
+            <a:off x="9206948" y="4430799"/>
+            <a:ext cx="2879725" cy="1994535"/>
           </a:xfrm>
           <a:prstGeom prst="rect">
             <a:avLst/>
@@ -5843,17 +5791,56 @@
           </a:p>
         </p:txBody>
       </p:sp>
+      <p:sp>
+        <p:nvSpPr>
+          <p:cNvPr id="8" name="Tekstvak 7">
+            <a:extLst>
+              <a:ext uri="{FF2B5EF4-FFF2-40B4-BE49-F238E27FC236}">
+                <a16:creationId xmlns:a16="http://schemas.microsoft.com/office/drawing/2014/main" id="{F34F0CB6-650B-4FD5-ACDE-568F38B132F9}"/>
+              </a:ext>
+            </a:extLst>
+          </p:cNvPr>
+          <p:cNvSpPr txBox="1"/>
+          <p:nvPr/>
+        </p:nvSpPr>
+        <p:spPr>
+          <a:xfrm>
+            <a:off x="838200" y="5701004"/>
+            <a:ext cx="5238998" cy="492443"/>
+          </a:xfrm>
+          <a:prstGeom prst="rect">
+            <a:avLst/>
+          </a:prstGeom>
+          <a:noFill/>
+        </p:spPr>
+        <p:txBody>
+          <a:bodyPr wrap="none" rtlCol="0">
+            <a:spAutoFit/>
+          </a:bodyPr>
+          <a:lstStyle/>
+          <a:p>
+            <a:r>
+              <a:rPr lang="nl-NL" sz="2600" dirty="0"/>
+              <a:t>Mean areal precipitation is 9.22 mm. </a:t>
+            </a:r>
+          </a:p>
+        </p:txBody>
+      </p:sp>
       <p:pic>
         <p:nvPicPr>
-          <p:cNvPr id="4" name="Picture 82">
-            <a:extLst>
-              <a:ext uri="{FF2B5EF4-FFF2-40B4-BE49-F238E27FC236}">
-                <a16:creationId xmlns:a16="http://schemas.microsoft.com/office/drawing/2014/main" id="{64930577-2CA1-45A5-BB69-23BC06EA2413}"/>
-              </a:ext>
-            </a:extLst>
-          </p:cNvPr>
-          <p:cNvPicPr/>
-          <p:nvPr/>
+          <p:cNvPr id="10" name="Content Placeholder 9">
+            <a:extLst>
+              <a:ext uri="{FF2B5EF4-FFF2-40B4-BE49-F238E27FC236}">
+                <a16:creationId xmlns:a16="http://schemas.microsoft.com/office/drawing/2014/main" id="{5AECCF60-71B5-44ED-BD41-5C36A6392B09}"/>
+              </a:ext>
+            </a:extLst>
+          </p:cNvPr>
+          <p:cNvPicPr>
+            <a:picLocks noGrp="1"/>
+          </p:cNvPicPr>
+          <p:nvPr>
+            <p:ph idx="1"/>
+          </p:nvPr>
         </p:nvPicPr>
         <p:blipFill>
           <a:blip r:embed="rId2"/>
@@ -5863,8 +5850,8 @@
         </p:blipFill>
         <p:spPr>
           <a:xfrm>
-            <a:off x="336000" y="1564981"/>
-            <a:ext cx="5760000" cy="3852000"/>
+            <a:off x="711591" y="1690688"/>
+            <a:ext cx="5238998" cy="3503789"/>
           </a:xfrm>
           <a:prstGeom prst="rect">
             <a:avLst/>
@@ -5873,19 +5860,15 @@
       </p:pic>
       <p:pic>
         <p:nvPicPr>
-          <p:cNvPr id="5" name="Picture 84">
-            <a:extLst>
-              <a:ext uri="{FF2B5EF4-FFF2-40B4-BE49-F238E27FC236}">
-                <a16:creationId xmlns:a16="http://schemas.microsoft.com/office/drawing/2014/main" id="{473A4B01-D491-45C3-909F-B4DA547666B2}"/>
-              </a:ext>
-            </a:extLst>
-          </p:cNvPr>
-          <p:cNvPicPr>
-            <a:picLocks noGrp="1"/>
-          </p:cNvPicPr>
-          <p:nvPr>
-            <p:ph idx="1"/>
-          </p:nvPr>
+          <p:cNvPr id="11" name="Picture 10">
+            <a:extLst>
+              <a:ext uri="{FF2B5EF4-FFF2-40B4-BE49-F238E27FC236}">
+                <a16:creationId xmlns:a16="http://schemas.microsoft.com/office/drawing/2014/main" id="{F8092930-2273-4496-AF1F-A07CAEA4D680}"/>
+              </a:ext>
+            </a:extLst>
+          </p:cNvPr>
+          <p:cNvPicPr/>
+          <p:nvPr/>
         </p:nvPicPr>
         <p:blipFill>
           <a:blip r:embed="rId3"/>
@@ -5895,8 +5878,8 @@
         </p:blipFill>
         <p:spPr>
           <a:xfrm>
-            <a:off x="6096000" y="1441019"/>
-            <a:ext cx="5760000" cy="3988800"/>
+            <a:off x="6624710" y="1690688"/>
+            <a:ext cx="5058946" cy="3503789"/>
           </a:xfrm>
           <a:prstGeom prst="rect">
             <a:avLst/>
@@ -5905,10 +5888,10 @@
       </p:pic>
       <p:pic>
         <p:nvPicPr>
-          <p:cNvPr id="6" name="Afbeelding 5">
-            <a:extLst>
-              <a:ext uri="{FF2B5EF4-FFF2-40B4-BE49-F238E27FC236}">
-                <a16:creationId xmlns:a16="http://schemas.microsoft.com/office/drawing/2014/main" id="{D3154F41-6541-4B02-960E-4149A5AE443B}"/>
+          <p:cNvPr id="12" name="Afbeelding 1">
+            <a:extLst>
+              <a:ext uri="{FF2B5EF4-FFF2-40B4-BE49-F238E27FC236}">
+                <a16:creationId xmlns:a16="http://schemas.microsoft.com/office/drawing/2014/main" id="{B5C2268E-8D92-4163-973F-432C17F50593}"/>
               </a:ext>
             </a:extLst>
           </p:cNvPr>
@@ -5923,8 +5906,8 @@
         </p:blipFill>
         <p:spPr>
           <a:xfrm>
-            <a:off x="606588" y="3548288"/>
-            <a:ext cx="2880000" cy="1926000"/>
+            <a:off x="572821" y="3429000"/>
+            <a:ext cx="2879725" cy="1925955"/>
           </a:xfrm>
           <a:prstGeom prst="rect">
             <a:avLst/>
@@ -5933,16 +5916,14 @@
       </p:pic>
       <p:pic>
         <p:nvPicPr>
-          <p:cNvPr id="7" name="Tijdelijke aanduiding voor inhoud 5">
-            <a:extLst>
-              <a:ext uri="{FF2B5EF4-FFF2-40B4-BE49-F238E27FC236}">
-                <a16:creationId xmlns:a16="http://schemas.microsoft.com/office/drawing/2014/main" id="{9ED4FBC5-F708-484E-8F47-D287F81ED8CA}"/>
-              </a:ext>
-            </a:extLst>
-          </p:cNvPr>
-          <p:cNvPicPr>
-            <a:picLocks/>
-          </p:cNvPicPr>
+          <p:cNvPr id="13" name="Afbeelding 74">
+            <a:extLst>
+              <a:ext uri="{FF2B5EF4-FFF2-40B4-BE49-F238E27FC236}">
+                <a16:creationId xmlns:a16="http://schemas.microsoft.com/office/drawing/2014/main" id="{85BDE278-9FCE-4759-8AE5-181C9D229D75}"/>
+              </a:ext>
+            </a:extLst>
+          </p:cNvPr>
+          <p:cNvPicPr/>
           <p:nvPr/>
         </p:nvPicPr>
         <p:blipFill>
@@ -5953,69 +5934,14 @@
         </p:blipFill>
         <p:spPr>
           <a:xfrm>
-            <a:off x="9745728" y="3021579"/>
-            <a:ext cx="2880000" cy="1980000"/>
+            <a:off x="8803931" y="4170044"/>
+            <a:ext cx="2879725" cy="1994535"/>
           </a:xfrm>
           <a:prstGeom prst="rect">
             <a:avLst/>
           </a:prstGeom>
         </p:spPr>
       </p:pic>
-      <p:sp>
-        <p:nvSpPr>
-          <p:cNvPr id="8" name="Tekstvak 7">
-            <a:extLst>
-              <a:ext uri="{FF2B5EF4-FFF2-40B4-BE49-F238E27FC236}">
-                <a16:creationId xmlns:a16="http://schemas.microsoft.com/office/drawing/2014/main" id="{F34F0CB6-650B-4FD5-ACDE-568F38B132F9}"/>
-              </a:ext>
-            </a:extLst>
-          </p:cNvPr>
-          <p:cNvSpPr txBox="1"/>
-          <p:nvPr/>
-        </p:nvSpPr>
-        <p:spPr>
-          <a:xfrm>
-            <a:off x="838200" y="5701004"/>
-            <a:ext cx="5238998" cy="492443"/>
-          </a:xfrm>
-          <a:prstGeom prst="rect">
-            <a:avLst/>
-          </a:prstGeom>
-          <a:noFill/>
-        </p:spPr>
-        <p:txBody>
-          <a:bodyPr wrap="none" rtlCol="0">
-            <a:spAutoFit/>
-          </a:bodyPr>
-          <a:lstStyle/>
-          <a:p>
-            <a:r>
-              <a:rPr lang="nl-NL" sz="2600" dirty="0" err="1"/>
-              <a:t>Mean</a:t>
-            </a:r>
-            <a:r>
-              <a:rPr lang="nl-NL" sz="2600" dirty="0"/>
-              <a:t> </a:t>
-            </a:r>
-            <a:r>
-              <a:rPr lang="nl-NL" sz="2600" dirty="0" err="1"/>
-              <a:t>areal</a:t>
-            </a:r>
-            <a:r>
-              <a:rPr lang="nl-NL" sz="2600" dirty="0"/>
-              <a:t> </a:t>
-            </a:r>
-            <a:r>
-              <a:rPr lang="nl-NL" sz="2600" dirty="0" err="1"/>
-              <a:t>precipitation</a:t>
-            </a:r>
-            <a:r>
-              <a:rPr lang="nl-NL" sz="2600" dirty="0"/>
-              <a:t> is 13.5 mm. </a:t>
-            </a:r>
-          </a:p>
-        </p:txBody>
-      </p:sp>
     </p:spTree>
     <p:extLst>
       <p:ext uri="{BB962C8B-B14F-4D97-AF65-F5344CB8AC3E}">
@@ -6121,98 +6047,9 @@
           <a:lstStyle/>
           <a:p>
             <a:r>
-              <a:rPr lang="nl-NL" dirty="0" err="1"/>
-              <a:t>If</a:t>
-            </a:r>
-            <a:r>
-              <a:rPr lang="nl-NL" dirty="0"/>
-              <a:t> we set </a:t>
-            </a:r>
-            <a:r>
-              <a:rPr lang="nl-NL" dirty="0" err="1"/>
-              <a:t>the</a:t>
-            </a:r>
-            <a:r>
-              <a:rPr lang="nl-NL" dirty="0"/>
-              <a:t> ice </a:t>
-            </a:r>
-            <a:r>
-              <a:rPr lang="nl-NL" dirty="0" err="1"/>
-              <a:t>initiation</a:t>
-            </a:r>
-            <a:r>
-              <a:rPr lang="nl-NL" dirty="0"/>
-              <a:t> </a:t>
-            </a:r>
-            <a:r>
-              <a:rPr lang="nl-NL" dirty="0" err="1"/>
-              <a:t>lower</a:t>
-            </a:r>
-            <a:r>
-              <a:rPr lang="nl-NL" dirty="0"/>
-              <a:t>, no ice is </a:t>
-            </a:r>
-            <a:r>
-              <a:rPr lang="nl-NL" dirty="0" err="1"/>
-              <a:t>initiated</a:t>
-            </a:r>
-            <a:r>
-              <a:rPr lang="nl-NL" dirty="0"/>
-              <a:t> </a:t>
-            </a:r>
-            <a:r>
-              <a:rPr lang="nl-NL" dirty="0" err="1"/>
-              <a:t>and</a:t>
-            </a:r>
-            <a:r>
-              <a:rPr lang="nl-NL" dirty="0"/>
-              <a:t> </a:t>
-            </a:r>
-            <a:r>
-              <a:rPr lang="nl-NL" dirty="0" err="1"/>
-              <a:t>less</a:t>
-            </a:r>
-            <a:r>
-              <a:rPr lang="nl-NL" dirty="0"/>
-              <a:t> (</a:t>
-            </a:r>
-            <a:r>
-              <a:rPr lang="nl-NL" dirty="0" err="1"/>
-              <a:t>only</a:t>
-            </a:r>
-            <a:r>
-              <a:rPr lang="nl-NL" dirty="0"/>
-              <a:t> “warm”) </a:t>
-            </a:r>
-            <a:r>
-              <a:rPr lang="nl-NL" dirty="0" err="1"/>
-              <a:t>precipitation</a:t>
-            </a:r>
-            <a:r>
-              <a:rPr lang="nl-NL" dirty="0"/>
-              <a:t> </a:t>
-            </a:r>
-            <a:r>
-              <a:rPr lang="nl-NL" dirty="0" err="1"/>
-              <a:t>can</a:t>
-            </a:r>
-            <a:r>
-              <a:rPr lang="nl-NL" dirty="0"/>
-              <a:t> </a:t>
-            </a:r>
-            <a:r>
-              <a:rPr lang="nl-NL" dirty="0" err="1"/>
-              <a:t>be</a:t>
-            </a:r>
-            <a:r>
-              <a:rPr lang="nl-NL" dirty="0"/>
-              <a:t> </a:t>
-            </a:r>
-            <a:r>
-              <a:rPr lang="nl-NL" dirty="0" err="1"/>
-              <a:t>produced</a:t>
-            </a:r>
-            <a:endParaRPr lang="nl-NL" dirty="0"/>
+              <a:rPr lang="nl-NL" dirty="0"/>
+              <a:t>If we set the ice initiation lower, little ice is initiated and less (mostly “warm”) precipitation can be produced</a:t>
+            </a:r>
           </a:p>
           <a:p>
             <a:r>
@@ -6302,7 +6139,10 @@
             <a:pPr marL="0" indent="0">
               <a:buNone/>
             </a:pPr>
-            <a:endParaRPr lang="nl-NL" dirty="0"/>
+            <a:r>
+              <a:rPr lang="nl-NL" dirty="0"/>
+              <a:t>Cconv=50                                                 Cconv=1</a:t>
+            </a:r>
           </a:p>
           <a:p>
             <a:endParaRPr lang="nl-NL" dirty="0"/>
@@ -6311,10 +6151,10 @@
       </p:sp>
       <p:pic>
         <p:nvPicPr>
-          <p:cNvPr id="4" name="Picture 118">
-            <a:extLst>
-              <a:ext uri="{FF2B5EF4-FFF2-40B4-BE49-F238E27FC236}">
-                <a16:creationId xmlns:a16="http://schemas.microsoft.com/office/drawing/2014/main" id="{EAD8210E-6AB0-408E-B09D-BED60AB86C02}"/>
+          <p:cNvPr id="6" name="Picture 5">
+            <a:extLst>
+              <a:ext uri="{FF2B5EF4-FFF2-40B4-BE49-F238E27FC236}">
+                <a16:creationId xmlns:a16="http://schemas.microsoft.com/office/drawing/2014/main" id="{6AC421C8-A074-4657-B1E7-69E695750B2B}"/>
               </a:ext>
             </a:extLst>
           </p:cNvPr>
@@ -6329,8 +6169,8 @@
         </p:blipFill>
         <p:spPr>
           <a:xfrm>
-            <a:off x="838200" y="4001294"/>
-            <a:ext cx="4320000" cy="2880000"/>
+            <a:off x="586521" y="4658360"/>
+            <a:ext cx="2743200" cy="1834515"/>
           </a:xfrm>
           <a:prstGeom prst="rect">
             <a:avLst/>
@@ -6339,10 +6179,10 @@
       </p:pic>
       <p:pic>
         <p:nvPicPr>
-          <p:cNvPr id="5" name="Picture 120">
-            <a:extLst>
-              <a:ext uri="{FF2B5EF4-FFF2-40B4-BE49-F238E27FC236}">
-                <a16:creationId xmlns:a16="http://schemas.microsoft.com/office/drawing/2014/main" id="{B073DEED-F9BB-4776-8C12-8CF2F439DE00}"/>
+          <p:cNvPr id="7" name="Picture 6">
+            <a:extLst>
+              <a:ext uri="{FF2B5EF4-FFF2-40B4-BE49-F238E27FC236}">
+                <a16:creationId xmlns:a16="http://schemas.microsoft.com/office/drawing/2014/main" id="{28F4C643-7EA6-4442-9A02-EAB02814334E}"/>
               </a:ext>
             </a:extLst>
           </p:cNvPr>
@@ -6357,8 +6197,64 @@
         </p:blipFill>
         <p:spPr>
           <a:xfrm>
-            <a:off x="6189307" y="3978000"/>
-            <a:ext cx="4320000" cy="2880000"/>
+            <a:off x="3352800" y="4658360"/>
+            <a:ext cx="2743200" cy="1899920"/>
+          </a:xfrm>
+          <a:prstGeom prst="rect">
+            <a:avLst/>
+          </a:prstGeom>
+        </p:spPr>
+      </p:pic>
+      <p:pic>
+        <p:nvPicPr>
+          <p:cNvPr id="8" name="Picture 7">
+            <a:extLst>
+              <a:ext uri="{FF2B5EF4-FFF2-40B4-BE49-F238E27FC236}">
+                <a16:creationId xmlns:a16="http://schemas.microsoft.com/office/drawing/2014/main" id="{F4ADB074-BC38-4F30-AA71-0EE97D9A52FD}"/>
+              </a:ext>
+            </a:extLst>
+          </p:cNvPr>
+          <p:cNvPicPr/>
+          <p:nvPr/>
+        </p:nvPicPr>
+        <p:blipFill>
+          <a:blip r:embed="rId4"/>
+          <a:stretch>
+            <a:fillRect/>
+          </a:stretch>
+        </p:blipFill>
+        <p:spPr>
+          <a:xfrm>
+            <a:off x="6538913" y="4723765"/>
+            <a:ext cx="2743200" cy="1834515"/>
+          </a:xfrm>
+          <a:prstGeom prst="rect">
+            <a:avLst/>
+          </a:prstGeom>
+        </p:spPr>
+      </p:pic>
+      <p:pic>
+        <p:nvPicPr>
+          <p:cNvPr id="9" name="Picture 8">
+            <a:extLst>
+              <a:ext uri="{FF2B5EF4-FFF2-40B4-BE49-F238E27FC236}">
+                <a16:creationId xmlns:a16="http://schemas.microsoft.com/office/drawing/2014/main" id="{4D2B14E7-4C4E-4C5A-B883-8D6485BE4F75}"/>
+              </a:ext>
+            </a:extLst>
+          </p:cNvPr>
+          <p:cNvPicPr/>
+          <p:nvPr/>
+        </p:nvPicPr>
+        <p:blipFill>
+          <a:blip r:embed="rId5"/>
+          <a:stretch>
+            <a:fillRect/>
+          </a:stretch>
+        </p:blipFill>
+        <p:spPr>
+          <a:xfrm>
+            <a:off x="9282113" y="4723765"/>
+            <a:ext cx="2743200" cy="1899920"/>
           </a:xfrm>
           <a:prstGeom prst="rect">
             <a:avLst/>
@@ -6503,14 +6399,14 @@
           <p:nvPr>
             <p:extLst>
               <p:ext uri="{D42A27DB-BD31-4B8C-83A1-F6EECF244321}">
-                <p14:modId xmlns:p14="http://schemas.microsoft.com/office/powerpoint/2010/main" val="984786309"/>
+                <p14:modId xmlns:p14="http://schemas.microsoft.com/office/powerpoint/2010/main" val="604655352"/>
               </p:ext>
             </p:extLst>
           </p:nvPr>
         </p:nvGraphicFramePr>
         <p:xfrm>
-          <a:off x="1135356" y="2646120"/>
-          <a:ext cx="4430944" cy="1764894"/>
+          <a:off x="1402642" y="2660188"/>
+          <a:ext cx="4430944" cy="1874690"/>
         </p:xfrm>
         <a:graphic>
           <a:graphicData uri="http://schemas.openxmlformats.org/drawingml/2006/table">
@@ -6555,18 +6451,9 @@
                     <a:lstStyle/>
                     <a:p>
                       <a:r>
-                        <a:rPr lang="nl-NL" dirty="0" err="1"/>
+                        <a:rPr lang="nl-NL" dirty="0"/>
                         <a:t>Precipitation</a:t>
                       </a:r>
-                      <a:r>
-                        <a:rPr lang="nl-NL" dirty="0"/>
-                        <a:t> </a:t>
-                      </a:r>
-                      <a:r>
-                        <a:rPr lang="nl-NL" dirty="0" err="1"/>
-                        <a:t>reduction</a:t>
-                      </a:r>
-                      <a:endParaRPr lang="nl-NL" dirty="0"/>
                     </a:p>
                   </a:txBody>
                   <a:tcPr/>
@@ -6598,7 +6485,7 @@
                     <a:p>
                       <a:r>
                         <a:rPr lang="nl-NL" dirty="0"/>
-                        <a:t>49%</a:t>
+                        <a:t>2.34</a:t>
                       </a:r>
                     </a:p>
                   </a:txBody>
@@ -6631,7 +6518,7 @@
                     <a:p>
                       <a:r>
                         <a:rPr lang="nl-NL" dirty="0"/>
-                        <a:t>83%</a:t>
+                        <a:t>0.34</a:t>
                       </a:r>
                     </a:p>
                   </a:txBody>
@@ -6664,7 +6551,7 @@
                     <a:p>
                       <a:r>
                         <a:rPr lang="nl-NL" dirty="0"/>
-                        <a:t>90%</a:t>
+                        <a:t>0.18</a:t>
                       </a:r>
                     </a:p>
                   </a:txBody>
@@ -6673,6 +6560,39 @@
                 <a:extLst>
                   <a:ext uri="{0D108BD9-81ED-4DB2-BD59-A6C34878D82A}">
                     <a16:rowId xmlns:a16="http://schemas.microsoft.com/office/drawing/2014/main" val="3431542153"/>
+                  </a:ext>
+                </a:extLst>
+              </a:tr>
+              <a:tr h="374938">
+                <a:tc>
+                  <a:txBody>
+                    <a:bodyPr/>
+                    <a:lstStyle/>
+                    <a:p>
+                      <a:r>
+                        <a:rPr lang="nl-NL" dirty="0"/>
+                        <a:t>99%</a:t>
+                      </a:r>
+                    </a:p>
+                  </a:txBody>
+                  <a:tcPr/>
+                </a:tc>
+                <a:tc>
+                  <a:txBody>
+                    <a:bodyPr/>
+                    <a:lstStyle/>
+                    <a:p>
+                      <a:r>
+                        <a:rPr lang="nl-NL" dirty="0"/>
+                        <a:t>0.11</a:t>
+                      </a:r>
+                    </a:p>
+                  </a:txBody>
+                  <a:tcPr/>
+                </a:tc>
+                <a:extLst>
+                  <a:ext uri="{0D108BD9-81ED-4DB2-BD59-A6C34878D82A}">
+                    <a16:rowId xmlns:a16="http://schemas.microsoft.com/office/drawing/2014/main" val="3951138971"/>
                   </a:ext>
                 </a:extLst>
               </a:tr>
@@ -7840,7 +7760,7 @@
         </p:nvSpPr>
         <p:spPr>
           <a:xfrm>
-            <a:off x="3070368" y="5025009"/>
+            <a:off x="2859667" y="4060275"/>
             <a:ext cx="2332139" cy="1442906"/>
           </a:xfrm>
           <a:prstGeom prst="roundRect">
@@ -7890,7 +7810,7 @@
         </p:nvSpPr>
         <p:spPr>
           <a:xfrm>
-            <a:off x="5402507" y="5146650"/>
+            <a:off x="5242030" y="4071249"/>
             <a:ext cx="2776755" cy="478172"/>
           </a:xfrm>
           <a:prstGeom prst="rightArrow">
@@ -7939,8 +7859,8 @@
         </p:nvSpPr>
         <p:spPr>
           <a:xfrm>
-            <a:off x="293613" y="5746462"/>
-            <a:ext cx="2776755" cy="478172"/>
+            <a:off x="450385" y="4785923"/>
+            <a:ext cx="2332139" cy="478172"/>
           </a:xfrm>
           <a:prstGeom prst="rightArrow">
             <a:avLst/>
@@ -7988,8 +7908,8 @@
         </p:nvSpPr>
         <p:spPr>
           <a:xfrm>
-            <a:off x="293613" y="5146650"/>
-            <a:ext cx="2776755" cy="478172"/>
+            <a:off x="565061" y="4052860"/>
+            <a:ext cx="2140321" cy="478172"/>
           </a:xfrm>
           <a:prstGeom prst="leftArrow">
             <a:avLst/>
@@ -8037,7 +7957,7 @@
         </p:nvSpPr>
         <p:spPr>
           <a:xfrm>
-            <a:off x="5402507" y="5746462"/>
+            <a:off x="5322645" y="4785923"/>
             <a:ext cx="2737607" cy="478172"/>
           </a:xfrm>
           <a:prstGeom prst="leftArrow">
@@ -8086,7 +8006,7 @@
         </p:nvSpPr>
         <p:spPr>
           <a:xfrm>
-            <a:off x="3921850" y="3347211"/>
+            <a:off x="3527363" y="2035309"/>
             <a:ext cx="526582" cy="1677798"/>
           </a:xfrm>
           <a:prstGeom prst="upDownArrow">
@@ -10399,18 +10319,16 @@
           <a:lstStyle/>
           <a:p>
             <a:r>
-              <a:rPr lang="nl-NL" dirty="0" err="1"/>
-              <a:t>Environmental</a:t>
-            </a:r>
-            <a:r>
-              <a:rPr lang="nl-NL" dirty="0"/>
-              <a:t> profile + </a:t>
-            </a:r>
-            <a:r>
-              <a:rPr lang="nl-NL" dirty="0" err="1"/>
-              <a:t>assumptions</a:t>
-            </a:r>
-            <a:endParaRPr lang="nl-NL" dirty="0"/>
+              <a:rPr lang="nl-NL" dirty="0"/>
+              <a:t>Environmental profile</a:t>
+            </a:r>
+            <a:br>
+              <a:rPr lang="nl-NL" dirty="0"/>
+            </a:br>
+            <a:r>
+              <a:rPr lang="nl-NL" dirty="0"/>
+              <a:t> + assumptions</a:t>
+            </a:r>
           </a:p>
         </p:txBody>
       </p:sp>
@@ -11433,8 +11351,8 @@
           <a:chExt cx="0" cy="0"/>
         </a:xfrm>
       </p:grpSpPr>
-      <mc:AlternateContent xmlns:mc="http://schemas.openxmlformats.org/markup-compatibility/2006">
-        <mc:Choice xmlns:a14="http://schemas.microsoft.com/office/drawing/2010/main" Requires="a14">
+      <mc:AlternateContent xmlns:mc="http://schemas.openxmlformats.org/markup-compatibility/2006" xmlns:a14="http://schemas.microsoft.com/office/drawing/2010/main">
+        <mc:Choice Requires="a14">
           <p:sp>
             <p:nvSpPr>
               <p:cNvPr id="2" name="Titel 1">
@@ -11532,7 +11450,7 @@
             </p:txBody>
           </p:sp>
         </mc:Choice>
-        <mc:Fallback>
+        <mc:Fallback xmlns="">
           <p:sp>
             <p:nvSpPr>
               <p:cNvPr id="2" name="Titel 1">
@@ -12280,8 +12198,8 @@
           <a:chExt cx="0" cy="0"/>
         </a:xfrm>
       </p:grpSpPr>
-      <mc:AlternateContent xmlns:mc="http://schemas.openxmlformats.org/markup-compatibility/2006">
-        <mc:Choice xmlns:a14="http://schemas.microsoft.com/office/drawing/2010/main" Requires="a14">
+      <mc:AlternateContent xmlns:mc="http://schemas.openxmlformats.org/markup-compatibility/2006" xmlns:a14="http://schemas.microsoft.com/office/drawing/2010/main">
+        <mc:Choice Requires="a14">
           <p:sp>
             <p:nvSpPr>
               <p:cNvPr id="2" name="Titel 1">
@@ -12449,7 +12367,7 @@
             </p:txBody>
           </p:sp>
         </mc:Choice>
-        <mc:Fallback>
+        <mc:Fallback xmlns="">
           <p:sp>
             <p:nvSpPr>
               <p:cNvPr id="2" name="Titel 1">
@@ -12489,8 +12407,8 @@
           </p:sp>
         </mc:Fallback>
       </mc:AlternateContent>
-      <mc:AlternateContent xmlns:mc="http://schemas.openxmlformats.org/markup-compatibility/2006">
-        <mc:Choice xmlns:a14="http://schemas.microsoft.com/office/drawing/2010/main" Requires="a14">
+      <mc:AlternateContent xmlns:mc="http://schemas.openxmlformats.org/markup-compatibility/2006" xmlns:a14="http://schemas.microsoft.com/office/drawing/2010/main">
+        <mc:Choice Requires="a14">
           <p:sp>
             <p:nvSpPr>
               <p:cNvPr id="7" name="Tekstvak 6">
@@ -12613,7 +12531,7 @@
             </p:txBody>
           </p:sp>
         </mc:Choice>
-        <mc:Fallback>
+        <mc:Fallback xmlns="">
           <p:sp>
             <p:nvSpPr>
               <p:cNvPr id="7" name="Tekstvak 6">

</xml_diff>